<commit_message>
Updated supp and revision2
</commit_message>
<xml_diff>
--- a/analyses/casrx/sanjana/figures/casrx.pptx
+++ b/analyses/casrx/sanjana/figures/casrx.pptx
@@ -197,7 +197,7 @@
           <a:p>
             <a:fld id="{05C67234-C5AE-DE47-9407-FFB76288A749}" type="datetimeFigureOut">
               <a:rPr lang="en-US" smtClean="0"/>
-              <a:t>10/16/22</a:t>
+              <a:t>10/17/22</a:t>
             </a:fld>
             <a:endParaRPr lang="en-US"/>
           </a:p>
@@ -684,7 +684,7 @@
           <a:p>
             <a:fld id="{527787EC-6066-3349-9042-9A14D70C7CEF}" type="datetimeFigureOut">
               <a:rPr lang="en-US" smtClean="0"/>
-              <a:t>10/16/22</a:t>
+              <a:t>10/17/22</a:t>
             </a:fld>
             <a:endParaRPr lang="en-US"/>
           </a:p>
@@ -854,7 +854,7 @@
           <a:p>
             <a:fld id="{527787EC-6066-3349-9042-9A14D70C7CEF}" type="datetimeFigureOut">
               <a:rPr lang="en-US" smtClean="0"/>
-              <a:t>10/16/22</a:t>
+              <a:t>10/17/22</a:t>
             </a:fld>
             <a:endParaRPr lang="en-US"/>
           </a:p>
@@ -1034,7 +1034,7 @@
           <a:p>
             <a:fld id="{527787EC-6066-3349-9042-9A14D70C7CEF}" type="datetimeFigureOut">
               <a:rPr lang="en-US" smtClean="0"/>
-              <a:t>10/16/22</a:t>
+              <a:t>10/17/22</a:t>
             </a:fld>
             <a:endParaRPr lang="en-US"/>
           </a:p>
@@ -1204,7 +1204,7 @@
           <a:p>
             <a:fld id="{527787EC-6066-3349-9042-9A14D70C7CEF}" type="datetimeFigureOut">
               <a:rPr lang="en-US" smtClean="0"/>
-              <a:t>10/16/22</a:t>
+              <a:t>10/17/22</a:t>
             </a:fld>
             <a:endParaRPr lang="en-US"/>
           </a:p>
@@ -1448,7 +1448,7 @@
           <a:p>
             <a:fld id="{527787EC-6066-3349-9042-9A14D70C7CEF}" type="datetimeFigureOut">
               <a:rPr lang="en-US" smtClean="0"/>
-              <a:t>10/16/22</a:t>
+              <a:t>10/17/22</a:t>
             </a:fld>
             <a:endParaRPr lang="en-US"/>
           </a:p>
@@ -1680,7 +1680,7 @@
           <a:p>
             <a:fld id="{527787EC-6066-3349-9042-9A14D70C7CEF}" type="datetimeFigureOut">
               <a:rPr lang="en-US" smtClean="0"/>
-              <a:t>10/16/22</a:t>
+              <a:t>10/17/22</a:t>
             </a:fld>
             <a:endParaRPr lang="en-US"/>
           </a:p>
@@ -2047,7 +2047,7 @@
           <a:p>
             <a:fld id="{527787EC-6066-3349-9042-9A14D70C7CEF}" type="datetimeFigureOut">
               <a:rPr lang="en-US" smtClean="0"/>
-              <a:t>10/16/22</a:t>
+              <a:t>10/17/22</a:t>
             </a:fld>
             <a:endParaRPr lang="en-US"/>
           </a:p>
@@ -2165,7 +2165,7 @@
           <a:p>
             <a:fld id="{527787EC-6066-3349-9042-9A14D70C7CEF}" type="datetimeFigureOut">
               <a:rPr lang="en-US" smtClean="0"/>
-              <a:t>10/16/22</a:t>
+              <a:t>10/17/22</a:t>
             </a:fld>
             <a:endParaRPr lang="en-US"/>
           </a:p>
@@ -2260,7 +2260,7 @@
           <a:p>
             <a:fld id="{527787EC-6066-3349-9042-9A14D70C7CEF}" type="datetimeFigureOut">
               <a:rPr lang="en-US" smtClean="0"/>
-              <a:t>10/16/22</a:t>
+              <a:t>10/17/22</a:t>
             </a:fld>
             <a:endParaRPr lang="en-US"/>
           </a:p>
@@ -2537,7 +2537,7 @@
           <a:p>
             <a:fld id="{527787EC-6066-3349-9042-9A14D70C7CEF}" type="datetimeFigureOut">
               <a:rPr lang="en-US" smtClean="0"/>
-              <a:t>10/16/22</a:t>
+              <a:t>10/17/22</a:t>
             </a:fld>
             <a:endParaRPr lang="en-US"/>
           </a:p>
@@ -2794,7 +2794,7 @@
           <a:p>
             <a:fld id="{527787EC-6066-3349-9042-9A14D70C7CEF}" type="datetimeFigureOut">
               <a:rPr lang="en-US" smtClean="0"/>
-              <a:t>10/16/22</a:t>
+              <a:t>10/17/22</a:t>
             </a:fld>
             <a:endParaRPr lang="en-US"/>
           </a:p>
@@ -3007,7 +3007,7 @@
           <a:p>
             <a:fld id="{527787EC-6066-3349-9042-9A14D70C7CEF}" type="datetimeFigureOut">
               <a:rPr lang="en-US" smtClean="0"/>
-              <a:t>10/16/22</a:t>
+              <a:t>10/17/22</a:t>
             </a:fld>
             <a:endParaRPr lang="en-US"/>
           </a:p>
@@ -3414,10 +3414,10 @@
       </p:grpSpPr>
       <p:pic>
         <p:nvPicPr>
-          <p:cNvPr id="9" name="Picture 8">
-            <a:extLst>
-              <a:ext uri="{FF2B5EF4-FFF2-40B4-BE49-F238E27FC236}">
-                <a16:creationId xmlns:a16="http://schemas.microsoft.com/office/drawing/2014/main" id="{CF5FEA1A-E95F-9D49-A768-696634FBCF4A}"/>
+          <p:cNvPr id="5" name="Picture 4">
+            <a:extLst>
+              <a:ext uri="{FF2B5EF4-FFF2-40B4-BE49-F238E27FC236}">
+                <a16:creationId xmlns:a16="http://schemas.microsoft.com/office/drawing/2014/main" id="{D28D3929-E2D9-5293-58C7-79D9EE4DD13F}"/>
               </a:ext>
             </a:extLst>
           </p:cNvPr>
@@ -3434,8 +3434,8 @@
         </p:blipFill>
         <p:spPr>
           <a:xfrm>
-            <a:off x="4690087" y="3673440"/>
-            <a:ext cx="1056064" cy="1689702"/>
+            <a:off x="4119271" y="1900302"/>
+            <a:ext cx="1539656" cy="1368582"/>
           </a:xfrm>
           <a:prstGeom prst="rect">
             <a:avLst/>
@@ -3444,10 +3444,10 @@
       </p:pic>
       <p:pic>
         <p:nvPicPr>
-          <p:cNvPr id="11" name="Picture 10">
-            <a:extLst>
-              <a:ext uri="{FF2B5EF4-FFF2-40B4-BE49-F238E27FC236}">
-                <a16:creationId xmlns:a16="http://schemas.microsoft.com/office/drawing/2014/main" id="{FCB2EAD1-51D4-274B-ADF9-9817E28EE744}"/>
+          <p:cNvPr id="9" name="Picture 8">
+            <a:extLst>
+              <a:ext uri="{FF2B5EF4-FFF2-40B4-BE49-F238E27FC236}">
+                <a16:creationId xmlns:a16="http://schemas.microsoft.com/office/drawing/2014/main" id="{CF5FEA1A-E95F-9D49-A768-696634FBCF4A}"/>
               </a:ext>
             </a:extLst>
           </p:cNvPr>
@@ -3464,6 +3464,36 @@
         </p:blipFill>
         <p:spPr>
           <a:xfrm>
+            <a:off x="4690087" y="3673440"/>
+            <a:ext cx="1056064" cy="1689702"/>
+          </a:xfrm>
+          <a:prstGeom prst="rect">
+            <a:avLst/>
+          </a:prstGeom>
+        </p:spPr>
+      </p:pic>
+      <p:pic>
+        <p:nvPicPr>
+          <p:cNvPr id="11" name="Picture 10">
+            <a:extLst>
+              <a:ext uri="{FF2B5EF4-FFF2-40B4-BE49-F238E27FC236}">
+                <a16:creationId xmlns:a16="http://schemas.microsoft.com/office/drawing/2014/main" id="{FCB2EAD1-51D4-274B-ADF9-9817E28EE744}"/>
+              </a:ext>
+            </a:extLst>
+          </p:cNvPr>
+          <p:cNvPicPr>
+            <a:picLocks noChangeAspect="1"/>
+          </p:cNvPicPr>
+          <p:nvPr/>
+        </p:nvPicPr>
+        <p:blipFill>
+          <a:blip r:embed="rId5"/>
+          <a:stretch>
+            <a:fillRect/>
+          </a:stretch>
+        </p:blipFill>
+        <p:spPr>
+          <a:xfrm>
             <a:off x="3920769" y="3678980"/>
             <a:ext cx="1052130" cy="1683408"/>
           </a:xfrm>
@@ -3487,7 +3517,7 @@
           <p:nvPr/>
         </p:nvPicPr>
         <p:blipFill>
-          <a:blip r:embed="rId5"/>
+          <a:blip r:embed="rId6"/>
           <a:stretch>
             <a:fillRect/>
           </a:stretch>
@@ -3571,10 +3601,10 @@
           <p:nvPr/>
         </p:nvPicPr>
         <p:blipFill>
-          <a:blip r:embed="rId6">
+          <a:blip r:embed="rId7">
             <a:extLst>
               <a:ext uri="{96DAC541-7B7A-43D3-8B79-37D633B846F1}">
-                <asvg:svgBlip xmlns:asvg="http://schemas.microsoft.com/office/drawing/2016/SVG/main" r:embed="rId7"/>
+                <asvg:svgBlip xmlns:asvg="http://schemas.microsoft.com/office/drawing/2016/SVG/main" r:embed="rId8"/>
               </a:ext>
             </a:extLst>
           </a:blip>
@@ -3694,10 +3724,10 @@
           <p:nvPr/>
         </p:nvPicPr>
         <p:blipFill>
-          <a:blip r:embed="rId6">
+          <a:blip r:embed="rId7">
             <a:extLst>
               <a:ext uri="{96DAC541-7B7A-43D3-8B79-37D633B846F1}">
-                <asvg:svgBlip xmlns:asvg="http://schemas.microsoft.com/office/drawing/2016/SVG/main" r:embed="rId7"/>
+                <asvg:svgBlip xmlns:asvg="http://schemas.microsoft.com/office/drawing/2016/SVG/main" r:embed="rId8"/>
               </a:ext>
             </a:extLst>
           </a:blip>
@@ -6692,156 +6722,6 @@
           <p:nvPr/>
         </p:nvPicPr>
         <p:blipFill>
-          <a:blip r:embed="rId8"/>
-          <a:stretch>
-            <a:fillRect/>
-          </a:stretch>
-        </p:blipFill>
-        <p:spPr>
-          <a:xfrm>
-            <a:off x="3966328" y="-17295"/>
-            <a:ext cx="1620926" cy="1620926"/>
-          </a:xfrm>
-          <a:prstGeom prst="rect">
-            <a:avLst/>
-          </a:prstGeom>
-        </p:spPr>
-      </p:pic>
-      <p:sp>
-        <p:nvSpPr>
-          <p:cNvPr id="73" name="TextBox 72">
-            <a:extLst>
-              <a:ext uri="{FF2B5EF4-FFF2-40B4-BE49-F238E27FC236}">
-                <a16:creationId xmlns:a16="http://schemas.microsoft.com/office/drawing/2014/main" id="{B025480B-7C77-B44A-A52B-4143A1645F18}"/>
-              </a:ext>
-            </a:extLst>
-          </p:cNvPr>
-          <p:cNvSpPr txBox="1"/>
-          <p:nvPr/>
-        </p:nvSpPr>
-        <p:spPr>
-          <a:xfrm rot="16200000">
-            <a:off x="3685857" y="675073"/>
-            <a:ext cx="711760" cy="215444"/>
-          </a:xfrm>
-          <a:prstGeom prst="rect">
-            <a:avLst/>
-          </a:prstGeom>
-          <a:noFill/>
-        </p:spPr>
-        <p:txBody>
-          <a:bodyPr wrap="square" rtlCol="0">
-            <a:spAutoFit/>
-          </a:bodyPr>
-          <a:lstStyle/>
-          <a:p>
-            <a:pPr algn="ctr"/>
-            <a:r>
-              <a:rPr lang="en-US" sz="800" dirty="0"/>
-              <a:t> Log</a:t>
-            </a:r>
-            <a:r>
-              <a:rPr lang="en-US" sz="800" baseline="-25000" dirty="0"/>
-              <a:t>2</a:t>
-            </a:r>
-            <a:r>
-              <a:rPr lang="en-US" sz="800" dirty="0"/>
-              <a:t> (FC)</a:t>
-            </a:r>
-          </a:p>
-        </p:txBody>
-      </p:sp>
-      <p:sp>
-        <p:nvSpPr>
-          <p:cNvPr id="77" name="TextBox 76">
-            <a:extLst>
-              <a:ext uri="{FF2B5EF4-FFF2-40B4-BE49-F238E27FC236}">
-                <a16:creationId xmlns:a16="http://schemas.microsoft.com/office/drawing/2014/main" id="{4168C69C-FCE7-D140-9DE1-D0B34268388B}"/>
-              </a:ext>
-            </a:extLst>
-          </p:cNvPr>
-          <p:cNvSpPr txBox="1"/>
-          <p:nvPr/>
-        </p:nvSpPr>
-        <p:spPr>
-          <a:xfrm>
-            <a:off x="4102424" y="1313332"/>
-            <a:ext cx="1553891" cy="215444"/>
-          </a:xfrm>
-          <a:prstGeom prst="rect">
-            <a:avLst/>
-          </a:prstGeom>
-          <a:noFill/>
-        </p:spPr>
-        <p:txBody>
-          <a:bodyPr wrap="square" rtlCol="0">
-            <a:spAutoFit/>
-          </a:bodyPr>
-          <a:lstStyle/>
-          <a:p>
-            <a:pPr algn="ctr"/>
-            <a:r>
-              <a:rPr lang="en-US" sz="800" dirty="0" err="1"/>
-              <a:t>CasRx</a:t>
-            </a:r>
-            <a:r>
-              <a:rPr lang="en-US" sz="800" dirty="0"/>
-              <a:t>-RF on-target score</a:t>
-            </a:r>
-          </a:p>
-        </p:txBody>
-      </p:sp>
-      <p:sp>
-        <p:nvSpPr>
-          <p:cNvPr id="78" name="TextBox 77">
-            <a:extLst>
-              <a:ext uri="{FF2B5EF4-FFF2-40B4-BE49-F238E27FC236}">
-                <a16:creationId xmlns:a16="http://schemas.microsoft.com/office/drawing/2014/main" id="{387AF467-BC15-F94C-B588-A3367C078BA1}"/>
-              </a:ext>
-            </a:extLst>
-          </p:cNvPr>
-          <p:cNvSpPr txBox="1"/>
-          <p:nvPr/>
-        </p:nvSpPr>
-        <p:spPr>
-          <a:xfrm>
-            <a:off x="4996760" y="999283"/>
-            <a:ext cx="529841" cy="215444"/>
-          </a:xfrm>
-          <a:prstGeom prst="rect">
-            <a:avLst/>
-          </a:prstGeom>
-          <a:noFill/>
-        </p:spPr>
-        <p:txBody>
-          <a:bodyPr wrap="square" rtlCol="0">
-            <a:spAutoFit/>
-          </a:bodyPr>
-          <a:lstStyle/>
-          <a:p>
-            <a:pPr algn="ctr"/>
-            <a:r>
-              <a:rPr lang="en-US" sz="800" dirty="0"/>
-              <a:t>r = 0.92 </a:t>
-            </a:r>
-          </a:p>
-        </p:txBody>
-      </p:sp>
-      <p:pic>
-        <p:nvPicPr>
-          <p:cNvPr id="3" name="Picture 2">
-            <a:extLst>
-              <a:ext uri="{FF2B5EF4-FFF2-40B4-BE49-F238E27FC236}">
-                <a16:creationId xmlns:a16="http://schemas.microsoft.com/office/drawing/2014/main" id="{E86646B8-9FD4-6740-B615-697272B222AC}"/>
-              </a:ext>
-            </a:extLst>
-          </p:cNvPr>
-          <p:cNvPicPr>
-            <a:picLocks noChangeAspect="1"/>
-          </p:cNvPicPr>
-          <p:nvPr/>
-        </p:nvPicPr>
-        <p:blipFill>
           <a:blip r:embed="rId9"/>
           <a:stretch>
             <a:fillRect/>
@@ -6849,14 +6729,134 @@
         </p:blipFill>
         <p:spPr>
           <a:xfrm>
-            <a:off x="4119276" y="1893515"/>
-            <a:ext cx="1532821" cy="1362508"/>
+            <a:off x="3966328" y="-17295"/>
+            <a:ext cx="1620926" cy="1620926"/>
           </a:xfrm>
           <a:prstGeom prst="rect">
             <a:avLst/>
           </a:prstGeom>
         </p:spPr>
       </p:pic>
+      <p:sp>
+        <p:nvSpPr>
+          <p:cNvPr id="73" name="TextBox 72">
+            <a:extLst>
+              <a:ext uri="{FF2B5EF4-FFF2-40B4-BE49-F238E27FC236}">
+                <a16:creationId xmlns:a16="http://schemas.microsoft.com/office/drawing/2014/main" id="{B025480B-7C77-B44A-A52B-4143A1645F18}"/>
+              </a:ext>
+            </a:extLst>
+          </p:cNvPr>
+          <p:cNvSpPr txBox="1"/>
+          <p:nvPr/>
+        </p:nvSpPr>
+        <p:spPr>
+          <a:xfrm rot="16200000">
+            <a:off x="3685857" y="675073"/>
+            <a:ext cx="711760" cy="215444"/>
+          </a:xfrm>
+          <a:prstGeom prst="rect">
+            <a:avLst/>
+          </a:prstGeom>
+          <a:noFill/>
+        </p:spPr>
+        <p:txBody>
+          <a:bodyPr wrap="square" rtlCol="0">
+            <a:spAutoFit/>
+          </a:bodyPr>
+          <a:lstStyle/>
+          <a:p>
+            <a:pPr algn="ctr"/>
+            <a:r>
+              <a:rPr lang="en-US" sz="800" dirty="0"/>
+              <a:t> Log</a:t>
+            </a:r>
+            <a:r>
+              <a:rPr lang="en-US" sz="800" baseline="-25000" dirty="0"/>
+              <a:t>2</a:t>
+            </a:r>
+            <a:r>
+              <a:rPr lang="en-US" sz="800" dirty="0"/>
+              <a:t> (FC)</a:t>
+            </a:r>
+          </a:p>
+        </p:txBody>
+      </p:sp>
+      <p:sp>
+        <p:nvSpPr>
+          <p:cNvPr id="77" name="TextBox 76">
+            <a:extLst>
+              <a:ext uri="{FF2B5EF4-FFF2-40B4-BE49-F238E27FC236}">
+                <a16:creationId xmlns:a16="http://schemas.microsoft.com/office/drawing/2014/main" id="{4168C69C-FCE7-D140-9DE1-D0B34268388B}"/>
+              </a:ext>
+            </a:extLst>
+          </p:cNvPr>
+          <p:cNvSpPr txBox="1"/>
+          <p:nvPr/>
+        </p:nvSpPr>
+        <p:spPr>
+          <a:xfrm>
+            <a:off x="4102424" y="1313332"/>
+            <a:ext cx="1553891" cy="215444"/>
+          </a:xfrm>
+          <a:prstGeom prst="rect">
+            <a:avLst/>
+          </a:prstGeom>
+          <a:noFill/>
+        </p:spPr>
+        <p:txBody>
+          <a:bodyPr wrap="square" rtlCol="0">
+            <a:spAutoFit/>
+          </a:bodyPr>
+          <a:lstStyle/>
+          <a:p>
+            <a:pPr algn="ctr"/>
+            <a:r>
+              <a:rPr lang="en-US" sz="800" dirty="0" err="1"/>
+              <a:t>CasRx</a:t>
+            </a:r>
+            <a:r>
+              <a:rPr lang="en-US" sz="800" dirty="0"/>
+              <a:t>-RF on-target score</a:t>
+            </a:r>
+          </a:p>
+        </p:txBody>
+      </p:sp>
+      <p:sp>
+        <p:nvSpPr>
+          <p:cNvPr id="78" name="TextBox 77">
+            <a:extLst>
+              <a:ext uri="{FF2B5EF4-FFF2-40B4-BE49-F238E27FC236}">
+                <a16:creationId xmlns:a16="http://schemas.microsoft.com/office/drawing/2014/main" id="{387AF467-BC15-F94C-B588-A3367C078BA1}"/>
+              </a:ext>
+            </a:extLst>
+          </p:cNvPr>
+          <p:cNvSpPr txBox="1"/>
+          <p:nvPr/>
+        </p:nvSpPr>
+        <p:spPr>
+          <a:xfrm>
+            <a:off x="4996760" y="999283"/>
+            <a:ext cx="529841" cy="215444"/>
+          </a:xfrm>
+          <a:prstGeom prst="rect">
+            <a:avLst/>
+          </a:prstGeom>
+          <a:noFill/>
+        </p:spPr>
+        <p:txBody>
+          <a:bodyPr wrap="square" rtlCol="0">
+            <a:spAutoFit/>
+          </a:bodyPr>
+          <a:lstStyle/>
+          <a:p>
+            <a:pPr algn="ctr"/>
+            <a:r>
+              <a:rPr lang="en-US" sz="800" dirty="0"/>
+              <a:t>r = 0.92 </a:t>
+            </a:r>
+          </a:p>
+        </p:txBody>
+      </p:sp>
       <p:sp>
         <p:nvSpPr>
           <p:cNvPr id="83" name="TextBox 82">
@@ -7489,10 +7489,10 @@
           <p:nvPr/>
         </p:nvPicPr>
         <p:blipFill>
-          <a:blip r:embed="rId6">
+          <a:blip r:embed="rId7">
             <a:extLst>
               <a:ext uri="{96DAC541-7B7A-43D3-8B79-37D633B846F1}">
-                <asvg:svgBlip xmlns:asvg="http://schemas.microsoft.com/office/drawing/2016/SVG/main" r:embed="rId7"/>
+                <asvg:svgBlip xmlns:asvg="http://schemas.microsoft.com/office/drawing/2016/SVG/main" r:embed="rId8"/>
               </a:ext>
             </a:extLst>
           </a:blip>
@@ -7891,6 +7891,294 @@
           <a:p>
             <a:pPr algn="ctr"/>
             <a:endParaRPr lang="en-US"/>
+          </a:p>
+        </p:txBody>
+      </p:sp>
+      <p:sp>
+        <p:nvSpPr>
+          <p:cNvPr id="6" name="TextBox 5">
+            <a:extLst>
+              <a:ext uri="{FF2B5EF4-FFF2-40B4-BE49-F238E27FC236}">
+                <a16:creationId xmlns:a16="http://schemas.microsoft.com/office/drawing/2014/main" id="{7DE1BA84-CBE7-021C-0A4A-C16A4F63B6C3}"/>
+              </a:ext>
+            </a:extLst>
+          </p:cNvPr>
+          <p:cNvSpPr txBox="1"/>
+          <p:nvPr/>
+        </p:nvSpPr>
+        <p:spPr>
+          <a:xfrm>
+            <a:off x="3978327" y="2405473"/>
+            <a:ext cx="711760" cy="146194"/>
+          </a:xfrm>
+          <a:prstGeom prst="rect">
+            <a:avLst/>
+          </a:prstGeom>
+          <a:noFill/>
+        </p:spPr>
+        <p:txBody>
+          <a:bodyPr wrap="square" rtlCol="0">
+            <a:spAutoFit/>
+          </a:bodyPr>
+          <a:lstStyle/>
+          <a:p>
+            <a:pPr algn="ctr"/>
+            <a:r>
+              <a:rPr lang="en-US" sz="350" dirty="0"/>
+              <a:t>n=945</a:t>
+            </a:r>
+          </a:p>
+        </p:txBody>
+      </p:sp>
+      <p:sp>
+        <p:nvSpPr>
+          <p:cNvPr id="7" name="TextBox 6">
+            <a:extLst>
+              <a:ext uri="{FF2B5EF4-FFF2-40B4-BE49-F238E27FC236}">
+                <a16:creationId xmlns:a16="http://schemas.microsoft.com/office/drawing/2014/main" id="{086ADDD8-FDB5-BA5A-05CB-3D3B28C9FF72}"/>
+              </a:ext>
+            </a:extLst>
+          </p:cNvPr>
+          <p:cNvSpPr txBox="1"/>
+          <p:nvPr/>
+        </p:nvSpPr>
+        <p:spPr>
+          <a:xfrm>
+            <a:off x="4088722" y="2344881"/>
+            <a:ext cx="711760" cy="146194"/>
+          </a:xfrm>
+          <a:prstGeom prst="rect">
+            <a:avLst/>
+          </a:prstGeom>
+          <a:noFill/>
+        </p:spPr>
+        <p:txBody>
+          <a:bodyPr wrap="square" rtlCol="0">
+            <a:spAutoFit/>
+          </a:bodyPr>
+          <a:lstStyle/>
+          <a:p>
+            <a:pPr algn="ctr"/>
+            <a:r>
+              <a:rPr lang="en-US" sz="350" dirty="0"/>
+              <a:t>n=110</a:t>
+            </a:r>
+          </a:p>
+        </p:txBody>
+      </p:sp>
+      <p:sp>
+        <p:nvSpPr>
+          <p:cNvPr id="8" name="TextBox 7">
+            <a:extLst>
+              <a:ext uri="{FF2B5EF4-FFF2-40B4-BE49-F238E27FC236}">
+                <a16:creationId xmlns:a16="http://schemas.microsoft.com/office/drawing/2014/main" id="{81B50418-BE97-F815-7915-0B279EF430A7}"/>
+              </a:ext>
+            </a:extLst>
+          </p:cNvPr>
+          <p:cNvSpPr txBox="1"/>
+          <p:nvPr/>
+        </p:nvSpPr>
+        <p:spPr>
+          <a:xfrm>
+            <a:off x="4212459" y="2237014"/>
+            <a:ext cx="711760" cy="146194"/>
+          </a:xfrm>
+          <a:prstGeom prst="rect">
+            <a:avLst/>
+          </a:prstGeom>
+          <a:noFill/>
+        </p:spPr>
+        <p:txBody>
+          <a:bodyPr wrap="square" rtlCol="0">
+            <a:spAutoFit/>
+          </a:bodyPr>
+          <a:lstStyle/>
+          <a:p>
+            <a:pPr algn="ctr"/>
+            <a:r>
+              <a:rPr lang="en-US" sz="350" dirty="0"/>
+              <a:t>n=246</a:t>
+            </a:r>
+          </a:p>
+        </p:txBody>
+      </p:sp>
+      <p:sp>
+        <p:nvSpPr>
+          <p:cNvPr id="10" name="TextBox 9">
+            <a:extLst>
+              <a:ext uri="{FF2B5EF4-FFF2-40B4-BE49-F238E27FC236}">
+                <a16:creationId xmlns:a16="http://schemas.microsoft.com/office/drawing/2014/main" id="{43073F34-399B-B102-EE8E-8F0955C74FD4}"/>
+              </a:ext>
+            </a:extLst>
+          </p:cNvPr>
+          <p:cNvSpPr txBox="1"/>
+          <p:nvPr/>
+        </p:nvSpPr>
+        <p:spPr>
+          <a:xfrm>
+            <a:off x="4328651" y="2160672"/>
+            <a:ext cx="711760" cy="146194"/>
+          </a:xfrm>
+          <a:prstGeom prst="rect">
+            <a:avLst/>
+          </a:prstGeom>
+          <a:noFill/>
+        </p:spPr>
+        <p:txBody>
+          <a:bodyPr wrap="square" rtlCol="0">
+            <a:spAutoFit/>
+          </a:bodyPr>
+          <a:lstStyle/>
+          <a:p>
+            <a:pPr algn="ctr"/>
+            <a:r>
+              <a:rPr lang="en-US" sz="350" dirty="0"/>
+              <a:t>n=459</a:t>
+            </a:r>
+          </a:p>
+        </p:txBody>
+      </p:sp>
+      <p:sp>
+        <p:nvSpPr>
+          <p:cNvPr id="12" name="TextBox 11">
+            <a:extLst>
+              <a:ext uri="{FF2B5EF4-FFF2-40B4-BE49-F238E27FC236}">
+                <a16:creationId xmlns:a16="http://schemas.microsoft.com/office/drawing/2014/main" id="{6C07CCDC-150B-0830-9B1D-C7D089A52019}"/>
+              </a:ext>
+            </a:extLst>
+          </p:cNvPr>
+          <p:cNvSpPr txBox="1"/>
+          <p:nvPr/>
+        </p:nvSpPr>
+        <p:spPr>
+          <a:xfrm>
+            <a:off x="4752076" y="2516244"/>
+            <a:ext cx="711760" cy="146194"/>
+          </a:xfrm>
+          <a:prstGeom prst="rect">
+            <a:avLst/>
+          </a:prstGeom>
+          <a:noFill/>
+        </p:spPr>
+        <p:txBody>
+          <a:bodyPr wrap="square" rtlCol="0">
+            <a:spAutoFit/>
+          </a:bodyPr>
+          <a:lstStyle/>
+          <a:p>
+            <a:pPr algn="ctr"/>
+            <a:r>
+              <a:rPr lang="en-US" sz="350" dirty="0"/>
+              <a:t>n=750</a:t>
+            </a:r>
+          </a:p>
+        </p:txBody>
+      </p:sp>
+      <p:sp>
+        <p:nvSpPr>
+          <p:cNvPr id="13" name="TextBox 12">
+            <a:extLst>
+              <a:ext uri="{FF2B5EF4-FFF2-40B4-BE49-F238E27FC236}">
+                <a16:creationId xmlns:a16="http://schemas.microsoft.com/office/drawing/2014/main" id="{6272B0F3-F03D-A5DD-C427-92B8DCE3FFE0}"/>
+              </a:ext>
+            </a:extLst>
+          </p:cNvPr>
+          <p:cNvSpPr txBox="1"/>
+          <p:nvPr/>
+        </p:nvSpPr>
+        <p:spPr>
+          <a:xfrm>
+            <a:off x="4866195" y="2368161"/>
+            <a:ext cx="711760" cy="146194"/>
+          </a:xfrm>
+          <a:prstGeom prst="rect">
+            <a:avLst/>
+          </a:prstGeom>
+          <a:noFill/>
+        </p:spPr>
+        <p:txBody>
+          <a:bodyPr wrap="square" rtlCol="0">
+            <a:spAutoFit/>
+          </a:bodyPr>
+          <a:lstStyle/>
+          <a:p>
+            <a:pPr algn="ctr"/>
+            <a:r>
+              <a:rPr lang="en-US" sz="350" dirty="0"/>
+              <a:t>n=63</a:t>
+            </a:r>
+          </a:p>
+        </p:txBody>
+      </p:sp>
+      <p:sp>
+        <p:nvSpPr>
+          <p:cNvPr id="14" name="TextBox 13">
+            <a:extLst>
+              <a:ext uri="{FF2B5EF4-FFF2-40B4-BE49-F238E27FC236}">
+                <a16:creationId xmlns:a16="http://schemas.microsoft.com/office/drawing/2014/main" id="{C8C1BD26-2089-1262-9602-B8408F21996C}"/>
+              </a:ext>
+            </a:extLst>
+          </p:cNvPr>
+          <p:cNvSpPr txBox="1"/>
+          <p:nvPr/>
+        </p:nvSpPr>
+        <p:spPr>
+          <a:xfrm>
+            <a:off x="4977716" y="2480065"/>
+            <a:ext cx="711760" cy="146194"/>
+          </a:xfrm>
+          <a:prstGeom prst="rect">
+            <a:avLst/>
+          </a:prstGeom>
+          <a:noFill/>
+        </p:spPr>
+        <p:txBody>
+          <a:bodyPr wrap="square" rtlCol="0">
+            <a:spAutoFit/>
+          </a:bodyPr>
+          <a:lstStyle/>
+          <a:p>
+            <a:pPr algn="ctr"/>
+            <a:r>
+              <a:rPr lang="en-US" sz="350" dirty="0"/>
+              <a:t>n=19</a:t>
+            </a:r>
+          </a:p>
+        </p:txBody>
+      </p:sp>
+      <p:sp>
+        <p:nvSpPr>
+          <p:cNvPr id="17" name="TextBox 16">
+            <a:extLst>
+              <a:ext uri="{FF2B5EF4-FFF2-40B4-BE49-F238E27FC236}">
+                <a16:creationId xmlns:a16="http://schemas.microsoft.com/office/drawing/2014/main" id="{3FA1EA95-602A-DC12-7E26-65C838B5D273}"/>
+              </a:ext>
+            </a:extLst>
+          </p:cNvPr>
+          <p:cNvSpPr txBox="1"/>
+          <p:nvPr/>
+        </p:nvSpPr>
+        <p:spPr>
+          <a:xfrm>
+            <a:off x="5092600" y="2180028"/>
+            <a:ext cx="711760" cy="146194"/>
+          </a:xfrm>
+          <a:prstGeom prst="rect">
+            <a:avLst/>
+          </a:prstGeom>
+          <a:noFill/>
+        </p:spPr>
+        <p:txBody>
+          <a:bodyPr wrap="square" rtlCol="0">
+            <a:spAutoFit/>
+          </a:bodyPr>
+          <a:lstStyle/>
+          <a:p>
+            <a:pPr algn="ctr"/>
+            <a:r>
+              <a:rPr lang="en-US" sz="350" dirty="0"/>
+              <a:t>n=905</a:t>
+            </a:r>
           </a:p>
         </p:txBody>
       </p:sp>

</xml_diff>